<commit_message>
Add the Watson Tone Analyzer service
</commit_message>
<xml_diff>
--- a/lab/Stock Portfolio Sample - Diagram.pptx
+++ b/lab/Stock Portfolio Sample - Diagram.pptx
@@ -227,7 +227,7 @@
             <a:fld id="{D0752B3F-16DD-4F19-ACDD-F2069BC5BD4E}" type="datetimeFigureOut">
               <a:rPr lang="en-US" smtClean="0"/>
               <a:pPr/>
-              <a:t>4/4/18</a:t>
+              <a:t>4/6/18</a:t>
             </a:fld>
             <a:endParaRPr lang="en-US"/>
           </a:p>
@@ -394,7 +394,7 @@
             <a:fld id="{9FA6D163-A0F5-498D-A72B-50DE16555140}" type="datetimeFigureOut">
               <a:rPr lang="en-US" smtClean="0"/>
               <a:pPr/>
-              <a:t>4/4/18</a:t>
+              <a:t>4/6/18</a:t>
             </a:fld>
             <a:endParaRPr lang="en-US"/>
           </a:p>
@@ -5192,17 +5192,17 @@
           </a:ln>
           <a:extLst>
             <a:ext uri="{FAA26D3D-D897-4be2-8F04-BA451C77F1D7}">
-              <ma14:placeholderFlag xmlns="" xmlns:ma14="http://schemas.microsoft.com/office/mac/drawingml/2011/main" val="1"/>
+              <ma14:placeholderFlag xmlns:ma14="http://schemas.microsoft.com/office/mac/drawingml/2011/main" xmlns="" val="1"/>
             </a:ext>
             <a:ext uri="{909E8E84-426E-40dd-AFC4-6F175D3DCCD1}">
-              <a14:hiddenFill xmlns="" xmlns:a14="http://schemas.microsoft.com/office/drawing/2010/main">
+              <a14:hiddenFill xmlns:a14="http://schemas.microsoft.com/office/drawing/2010/main" xmlns="">
                 <a:solidFill>
                   <a:srgbClr val="FFFFFF"/>
                 </a:solidFill>
               </a14:hiddenFill>
             </a:ext>
             <a:ext uri="{91240B29-F687-4f45-9708-019B960494DF}">
-              <a14:hiddenLine xmlns="" xmlns:a14="http://schemas.microsoft.com/office/drawing/2010/main" w="9525">
+              <a14:hiddenLine xmlns:a14="http://schemas.microsoft.com/office/drawing/2010/main" xmlns="" w="9525">
                 <a:solidFill>
                   <a:srgbClr val="000000"/>
                 </a:solidFill>
@@ -5738,17 +5738,17 @@
           </a:ln>
           <a:extLst>
             <a:ext uri="{FAA26D3D-D897-4be2-8F04-BA451C77F1D7}">
-              <ma14:placeholderFlag xmlns="" xmlns:ma14="http://schemas.microsoft.com/office/mac/drawingml/2011/main" val="1"/>
+              <ma14:placeholderFlag xmlns:ma14="http://schemas.microsoft.com/office/mac/drawingml/2011/main" xmlns="" val="1"/>
             </a:ext>
             <a:ext uri="{909E8E84-426E-40dd-AFC4-6F175D3DCCD1}">
-              <a14:hiddenFill xmlns="" xmlns:a14="http://schemas.microsoft.com/office/drawing/2010/main">
+              <a14:hiddenFill xmlns:a14="http://schemas.microsoft.com/office/drawing/2010/main" xmlns="">
                 <a:solidFill>
                   <a:srgbClr val="FFFFFF"/>
                 </a:solidFill>
               </a14:hiddenFill>
             </a:ext>
             <a:ext uri="{91240B29-F687-4f45-9708-019B960494DF}">
-              <a14:hiddenLine xmlns="" xmlns:a14="http://schemas.microsoft.com/office/drawing/2010/main" w="9525">
+              <a14:hiddenLine xmlns:a14="http://schemas.microsoft.com/office/drawing/2010/main" xmlns="" w="9525">
                 <a:solidFill>
                   <a:srgbClr val="000000"/>
                 </a:solidFill>
@@ -6223,17 +6223,17 @@
           </a:ln>
           <a:extLst>
             <a:ext uri="{FAA26D3D-D897-4be2-8F04-BA451C77F1D7}">
-              <ma14:placeholderFlag xmlns="" xmlns:ma14="http://schemas.microsoft.com/office/mac/drawingml/2011/main" val="1"/>
+              <ma14:placeholderFlag xmlns:ma14="http://schemas.microsoft.com/office/mac/drawingml/2011/main" xmlns="" val="1"/>
             </a:ext>
             <a:ext uri="{909E8E84-426E-40dd-AFC4-6F175D3DCCD1}">
-              <a14:hiddenFill xmlns="" xmlns:a14="http://schemas.microsoft.com/office/drawing/2010/main">
+              <a14:hiddenFill xmlns:a14="http://schemas.microsoft.com/office/drawing/2010/main" xmlns="">
                 <a:solidFill>
                   <a:srgbClr val="FFFFFF"/>
                 </a:solidFill>
               </a14:hiddenFill>
             </a:ext>
             <a:ext uri="{91240B29-F687-4f45-9708-019B960494DF}">
-              <a14:hiddenLine xmlns="" xmlns:a14="http://schemas.microsoft.com/office/drawing/2010/main" w="9525">
+              <a14:hiddenLine xmlns:a14="http://schemas.microsoft.com/office/drawing/2010/main" xmlns="" w="9525">
                 <a:solidFill>
                   <a:srgbClr val="000000"/>
                 </a:solidFill>
@@ -6338,17 +6338,17 @@
           </a:ln>
           <a:extLst>
             <a:ext uri="{FAA26D3D-D897-4be2-8F04-BA451C77F1D7}">
-              <ma14:placeholderFlag xmlns="" xmlns:ma14="http://schemas.microsoft.com/office/mac/drawingml/2011/main" val="1"/>
+              <ma14:placeholderFlag xmlns:ma14="http://schemas.microsoft.com/office/mac/drawingml/2011/main" xmlns="" val="1"/>
             </a:ext>
             <a:ext uri="{909E8E84-426E-40dd-AFC4-6F175D3DCCD1}">
-              <a14:hiddenFill xmlns="" xmlns:a14="http://schemas.microsoft.com/office/drawing/2010/main">
+              <a14:hiddenFill xmlns:a14="http://schemas.microsoft.com/office/drawing/2010/main" xmlns="">
                 <a:solidFill>
                   <a:srgbClr val="FFFFFF"/>
                 </a:solidFill>
               </a14:hiddenFill>
             </a:ext>
             <a:ext uri="{91240B29-F687-4f45-9708-019B960494DF}">
-              <a14:hiddenLine xmlns="" xmlns:a14="http://schemas.microsoft.com/office/drawing/2010/main" w="9525">
+              <a14:hiddenLine xmlns:a14="http://schemas.microsoft.com/office/drawing/2010/main" xmlns="" w="9525">
                 <a:solidFill>
                   <a:srgbClr val="000000"/>
                 </a:solidFill>
@@ -7570,17 +7570,17 @@
           </a:ln>
           <a:extLst>
             <a:ext uri="{FAA26D3D-D897-4be2-8F04-BA451C77F1D7}">
-              <ma14:placeholderFlag xmlns="" xmlns:ma14="http://schemas.microsoft.com/office/mac/drawingml/2011/main" val="1"/>
+              <ma14:placeholderFlag xmlns:ma14="http://schemas.microsoft.com/office/mac/drawingml/2011/main" xmlns="" val="1"/>
             </a:ext>
             <a:ext uri="{909E8E84-426E-40dd-AFC4-6F175D3DCCD1}">
-              <a14:hiddenFill xmlns="" xmlns:a14="http://schemas.microsoft.com/office/drawing/2010/main">
+              <a14:hiddenFill xmlns:a14="http://schemas.microsoft.com/office/drawing/2010/main" xmlns="">
                 <a:solidFill>
                   <a:srgbClr val="FFFFFF"/>
                 </a:solidFill>
               </a14:hiddenFill>
             </a:ext>
             <a:ext uri="{91240B29-F687-4f45-9708-019B960494DF}">
-              <a14:hiddenLine xmlns="" xmlns:a14="http://schemas.microsoft.com/office/drawing/2010/main" w="9525">
+              <a14:hiddenLine xmlns:a14="http://schemas.microsoft.com/office/drawing/2010/main" xmlns="" w="9525">
                 <a:solidFill>
                   <a:srgbClr val="000000"/>
                 </a:solidFill>
@@ -8473,17 +8473,17 @@
           </a:ln>
           <a:extLst>
             <a:ext uri="{FAA26D3D-D897-4be2-8F04-BA451C77F1D7}">
-              <ma14:placeholderFlag xmlns="" xmlns:ma14="http://schemas.microsoft.com/office/mac/drawingml/2011/main" val="1"/>
+              <ma14:placeholderFlag xmlns:ma14="http://schemas.microsoft.com/office/mac/drawingml/2011/main" xmlns="" val="1"/>
             </a:ext>
             <a:ext uri="{909E8E84-426E-40dd-AFC4-6F175D3DCCD1}">
-              <a14:hiddenFill xmlns="" xmlns:a14="http://schemas.microsoft.com/office/drawing/2010/main">
+              <a14:hiddenFill xmlns:a14="http://schemas.microsoft.com/office/drawing/2010/main" xmlns="">
                 <a:solidFill>
                   <a:srgbClr val="FFFFFF"/>
                 </a:solidFill>
               </a14:hiddenFill>
             </a:ext>
             <a:ext uri="{91240B29-F687-4f45-9708-019B960494DF}">
-              <a14:hiddenLine xmlns="" xmlns:a14="http://schemas.microsoft.com/office/drawing/2010/main" w="9525">
+              <a14:hiddenLine xmlns:a14="http://schemas.microsoft.com/office/drawing/2010/main" xmlns="" w="9525">
                 <a:solidFill>
                   <a:srgbClr val="000000"/>
                 </a:solidFill>
@@ -9202,17 +9202,17 @@
           </a:ln>
           <a:extLst>
             <a:ext uri="{FAA26D3D-D897-4be2-8F04-BA451C77F1D7}">
-              <ma14:placeholderFlag xmlns="" xmlns:ma14="http://schemas.microsoft.com/office/mac/drawingml/2011/main" val="1"/>
+              <ma14:placeholderFlag xmlns:ma14="http://schemas.microsoft.com/office/mac/drawingml/2011/main" xmlns="" val="1"/>
             </a:ext>
             <a:ext uri="{909E8E84-426E-40dd-AFC4-6F175D3DCCD1}">
-              <a14:hiddenFill xmlns="" xmlns:a14="http://schemas.microsoft.com/office/drawing/2010/main">
+              <a14:hiddenFill xmlns:a14="http://schemas.microsoft.com/office/drawing/2010/main" xmlns="">
                 <a:solidFill>
                   <a:srgbClr val="FFFFFF"/>
                 </a:solidFill>
               </a14:hiddenFill>
             </a:ext>
             <a:ext uri="{91240B29-F687-4f45-9708-019B960494DF}">
-              <a14:hiddenLine xmlns="" xmlns:a14="http://schemas.microsoft.com/office/drawing/2010/main" w="9525">
+              <a14:hiddenLine xmlns:a14="http://schemas.microsoft.com/office/drawing/2010/main" xmlns="" w="9525">
                 <a:solidFill>
                   <a:srgbClr val="000000"/>
                 </a:solidFill>
@@ -9687,17 +9687,17 @@
           </a:ln>
           <a:extLst>
             <a:ext uri="{FAA26D3D-D897-4be2-8F04-BA451C77F1D7}">
-              <ma14:placeholderFlag xmlns="" xmlns:ma14="http://schemas.microsoft.com/office/mac/drawingml/2011/main" val="1"/>
+              <ma14:placeholderFlag xmlns:ma14="http://schemas.microsoft.com/office/mac/drawingml/2011/main" xmlns="" val="1"/>
             </a:ext>
             <a:ext uri="{909E8E84-426E-40dd-AFC4-6F175D3DCCD1}">
-              <a14:hiddenFill xmlns="" xmlns:a14="http://schemas.microsoft.com/office/drawing/2010/main">
+              <a14:hiddenFill xmlns:a14="http://schemas.microsoft.com/office/drawing/2010/main" xmlns="">
                 <a:solidFill>
                   <a:srgbClr val="FFFFFF"/>
                 </a:solidFill>
               </a14:hiddenFill>
             </a:ext>
             <a:ext uri="{91240B29-F687-4f45-9708-019B960494DF}">
-              <a14:hiddenLine xmlns="" xmlns:a14="http://schemas.microsoft.com/office/drawing/2010/main" w="9525">
+              <a14:hiddenLine xmlns:a14="http://schemas.microsoft.com/office/drawing/2010/main" xmlns="" w="9525">
                 <a:solidFill>
                   <a:srgbClr val="000000"/>
                 </a:solidFill>
@@ -9802,17 +9802,17 @@
           </a:ln>
           <a:extLst>
             <a:ext uri="{FAA26D3D-D897-4be2-8F04-BA451C77F1D7}">
-              <ma14:placeholderFlag xmlns="" xmlns:ma14="http://schemas.microsoft.com/office/mac/drawingml/2011/main" val="1"/>
+              <ma14:placeholderFlag xmlns:ma14="http://schemas.microsoft.com/office/mac/drawingml/2011/main" xmlns="" val="1"/>
             </a:ext>
             <a:ext uri="{909E8E84-426E-40dd-AFC4-6F175D3DCCD1}">
-              <a14:hiddenFill xmlns="" xmlns:a14="http://schemas.microsoft.com/office/drawing/2010/main">
+              <a14:hiddenFill xmlns:a14="http://schemas.microsoft.com/office/drawing/2010/main" xmlns="">
                 <a:solidFill>
                   <a:srgbClr val="FFFFFF"/>
                 </a:solidFill>
               </a14:hiddenFill>
             </a:ext>
             <a:ext uri="{91240B29-F687-4f45-9708-019B960494DF}">
-              <a14:hiddenLine xmlns="" xmlns:a14="http://schemas.microsoft.com/office/drawing/2010/main" w="9525">
+              <a14:hiddenLine xmlns:a14="http://schemas.microsoft.com/office/drawing/2010/main" xmlns="" w="9525">
                 <a:solidFill>
                   <a:srgbClr val="000000"/>
                 </a:solidFill>
@@ -10758,17 +10758,17 @@
           </a:ln>
           <a:extLst>
             <a:ext uri="{FAA26D3D-D897-4be2-8F04-BA451C77F1D7}">
-              <ma14:placeholderFlag xmlns="" xmlns:ma14="http://schemas.microsoft.com/office/mac/drawingml/2011/main" val="1"/>
+              <ma14:placeholderFlag xmlns:ma14="http://schemas.microsoft.com/office/mac/drawingml/2011/main" xmlns="" val="1"/>
             </a:ext>
             <a:ext uri="{909E8E84-426E-40dd-AFC4-6F175D3DCCD1}">
-              <a14:hiddenFill xmlns="" xmlns:a14="http://schemas.microsoft.com/office/drawing/2010/main">
+              <a14:hiddenFill xmlns:a14="http://schemas.microsoft.com/office/drawing/2010/main" xmlns="">
                 <a:solidFill>
                   <a:srgbClr val="FFFFFF"/>
                 </a:solidFill>
               </a14:hiddenFill>
             </a:ext>
             <a:ext uri="{91240B29-F687-4f45-9708-019B960494DF}">
-              <a14:hiddenLine xmlns="" xmlns:a14="http://schemas.microsoft.com/office/drawing/2010/main" w="9525">
+              <a14:hiddenLine xmlns:a14="http://schemas.microsoft.com/office/drawing/2010/main" xmlns="" w="9525">
                 <a:solidFill>
                   <a:srgbClr val="000000"/>
                 </a:solidFill>
@@ -13115,17 +13115,17 @@
           </a:ln>
           <a:extLst>
             <a:ext uri="{FAA26D3D-D897-4be2-8F04-BA451C77F1D7}">
-              <ma14:placeholderFlag xmlns="" xmlns:ma14="http://schemas.microsoft.com/office/mac/drawingml/2011/main" val="1"/>
+              <ma14:placeholderFlag xmlns:ma14="http://schemas.microsoft.com/office/mac/drawingml/2011/main" xmlns="" val="1"/>
             </a:ext>
             <a:ext uri="{909E8E84-426E-40dd-AFC4-6F175D3DCCD1}">
-              <a14:hiddenFill xmlns="" xmlns:a14="http://schemas.microsoft.com/office/drawing/2010/main">
+              <a14:hiddenFill xmlns:a14="http://schemas.microsoft.com/office/drawing/2010/main" xmlns="">
                 <a:solidFill>
                   <a:srgbClr val="FFFFFF"/>
                 </a:solidFill>
               </a14:hiddenFill>
             </a:ext>
             <a:ext uri="{91240B29-F687-4f45-9708-019B960494DF}">
-              <a14:hiddenLine xmlns="" xmlns:a14="http://schemas.microsoft.com/office/drawing/2010/main" w="9525">
+              <a14:hiddenLine xmlns:a14="http://schemas.microsoft.com/office/drawing/2010/main" xmlns="" w="9525">
                 <a:solidFill>
                   <a:srgbClr val="000000"/>
                 </a:solidFill>
@@ -13209,14 +13209,14 @@
           </a:ln>
           <a:extLst>
             <a:ext uri="{909E8E84-426E-40dd-AFC4-6F175D3DCCD1}">
-              <a14:hiddenFill xmlns="" xmlns:a14="http://schemas.microsoft.com/office/drawing/2010/main">
+              <a14:hiddenFill xmlns:a14="http://schemas.microsoft.com/office/drawing/2010/main" xmlns="">
                 <a:solidFill>
                   <a:srgbClr val="FFFFFF"/>
                 </a:solidFill>
               </a14:hiddenFill>
             </a:ext>
             <a:ext uri="{91240B29-F687-4f45-9708-019B960494DF}">
-              <a14:hiddenLine xmlns="" xmlns:a14="http://schemas.microsoft.com/office/drawing/2010/main" w="9525">
+              <a14:hiddenLine xmlns:a14="http://schemas.microsoft.com/office/drawing/2010/main" xmlns="" w="9525">
                 <a:solidFill>
                   <a:srgbClr val="000000"/>
                 </a:solidFill>
@@ -13303,14 +13303,14 @@
           </a:ln>
           <a:extLst>
             <a:ext uri="{909E8E84-426E-40dd-AFC4-6F175D3DCCD1}">
-              <a14:hiddenFill xmlns="" xmlns:a14="http://schemas.microsoft.com/office/drawing/2010/main">
+              <a14:hiddenFill xmlns:a14="http://schemas.microsoft.com/office/drawing/2010/main" xmlns="">
                 <a:solidFill>
                   <a:srgbClr val="FFFFFF"/>
                 </a:solidFill>
               </a14:hiddenFill>
             </a:ext>
             <a:ext uri="{91240B29-F687-4f45-9708-019B960494DF}">
-              <a14:hiddenLine xmlns="" xmlns:a14="http://schemas.microsoft.com/office/drawing/2010/main" w="9525">
+              <a14:hiddenLine xmlns:a14="http://schemas.microsoft.com/office/drawing/2010/main" xmlns="" w="9525">
                 <a:solidFill>
                   <a:srgbClr val="000000"/>
                 </a:solidFill>
@@ -13390,14 +13390,14 @@
           </a:ln>
           <a:extLst>
             <a:ext uri="{909E8E84-426E-40dd-AFC4-6F175D3DCCD1}">
-              <a14:hiddenFill xmlns="" xmlns:a14="http://schemas.microsoft.com/office/drawing/2010/main">
+              <a14:hiddenFill xmlns:a14="http://schemas.microsoft.com/office/drawing/2010/main" xmlns="">
                 <a:solidFill>
                   <a:srgbClr val="FFFFFF"/>
                 </a:solidFill>
               </a14:hiddenFill>
             </a:ext>
             <a:ext uri="{91240B29-F687-4f45-9708-019B960494DF}">
-              <a14:hiddenLine xmlns="" xmlns:a14="http://schemas.microsoft.com/office/drawing/2010/main" w="9525">
+              <a14:hiddenLine xmlns:a14="http://schemas.microsoft.com/office/drawing/2010/main" xmlns="" w="9525">
                 <a:solidFill>
                   <a:srgbClr val="000000"/>
                 </a:solidFill>
@@ -13985,17 +13985,17 @@
           </a:ln>
           <a:extLst>
             <a:ext uri="{FAA26D3D-D897-4be2-8F04-BA451C77F1D7}">
-              <ma14:placeholderFlag xmlns="" xmlns:ma14="http://schemas.microsoft.com/office/mac/drawingml/2011/main" val="1"/>
+              <ma14:placeholderFlag xmlns:ma14="http://schemas.microsoft.com/office/mac/drawingml/2011/main" xmlns="" val="1"/>
             </a:ext>
             <a:ext uri="{909E8E84-426E-40dd-AFC4-6F175D3DCCD1}">
-              <a14:hiddenFill xmlns="" xmlns:a14="http://schemas.microsoft.com/office/drawing/2010/main">
+              <a14:hiddenFill xmlns:a14="http://schemas.microsoft.com/office/drawing/2010/main" xmlns="">
                 <a:solidFill>
                   <a:srgbClr val="FFFFFF"/>
                 </a:solidFill>
               </a14:hiddenFill>
             </a:ext>
             <a:ext uri="{91240B29-F687-4f45-9708-019B960494DF}">
-              <a14:hiddenLine xmlns="" xmlns:a14="http://schemas.microsoft.com/office/drawing/2010/main" w="9525">
+              <a14:hiddenLine xmlns:a14="http://schemas.microsoft.com/office/drawing/2010/main" xmlns="" w="9525">
                 <a:solidFill>
                   <a:srgbClr val="000000"/>
                 </a:solidFill>
@@ -14079,14 +14079,14 @@
           </a:ln>
           <a:extLst>
             <a:ext uri="{909E8E84-426E-40dd-AFC4-6F175D3DCCD1}">
-              <a14:hiddenFill xmlns="" xmlns:a14="http://schemas.microsoft.com/office/drawing/2010/main">
+              <a14:hiddenFill xmlns:a14="http://schemas.microsoft.com/office/drawing/2010/main" xmlns="">
                 <a:solidFill>
                   <a:srgbClr val="FFFFFF"/>
                 </a:solidFill>
               </a14:hiddenFill>
             </a:ext>
             <a:ext uri="{91240B29-F687-4f45-9708-019B960494DF}">
-              <a14:hiddenLine xmlns="" xmlns:a14="http://schemas.microsoft.com/office/drawing/2010/main" w="9525">
+              <a14:hiddenLine xmlns:a14="http://schemas.microsoft.com/office/drawing/2010/main" xmlns="" w="9525">
                 <a:solidFill>
                   <a:srgbClr val="000000"/>
                 </a:solidFill>
@@ -14173,14 +14173,14 @@
           </a:ln>
           <a:extLst>
             <a:ext uri="{909E8E84-426E-40dd-AFC4-6F175D3DCCD1}">
-              <a14:hiddenFill xmlns="" xmlns:a14="http://schemas.microsoft.com/office/drawing/2010/main">
+              <a14:hiddenFill xmlns:a14="http://schemas.microsoft.com/office/drawing/2010/main" xmlns="">
                 <a:solidFill>
                   <a:srgbClr val="FFFFFF"/>
                 </a:solidFill>
               </a14:hiddenFill>
             </a:ext>
             <a:ext uri="{91240B29-F687-4f45-9708-019B960494DF}">
-              <a14:hiddenLine xmlns="" xmlns:a14="http://schemas.microsoft.com/office/drawing/2010/main" w="9525">
+              <a14:hiddenLine xmlns:a14="http://schemas.microsoft.com/office/drawing/2010/main" xmlns="" w="9525">
                 <a:solidFill>
                   <a:srgbClr val="000000"/>
                 </a:solidFill>
@@ -14260,14 +14260,14 @@
           </a:ln>
           <a:extLst>
             <a:ext uri="{909E8E84-426E-40dd-AFC4-6F175D3DCCD1}">
-              <a14:hiddenFill xmlns="" xmlns:a14="http://schemas.microsoft.com/office/drawing/2010/main">
+              <a14:hiddenFill xmlns:a14="http://schemas.microsoft.com/office/drawing/2010/main" xmlns="">
                 <a:solidFill>
                   <a:srgbClr val="FFFFFF"/>
                 </a:solidFill>
               </a14:hiddenFill>
             </a:ext>
             <a:ext uri="{91240B29-F687-4f45-9708-019B960494DF}">
-              <a14:hiddenLine xmlns="" xmlns:a14="http://schemas.microsoft.com/office/drawing/2010/main" w="9525">
+              <a14:hiddenLine xmlns:a14="http://schemas.microsoft.com/office/drawing/2010/main" xmlns="" w="9525">
                 <a:solidFill>
                   <a:srgbClr val="000000"/>
                 </a:solidFill>
@@ -15164,7 +15164,7 @@
         </p:nvSpPr>
         <p:spPr>
           <a:xfrm>
-            <a:off x="10754270" y="2404189"/>
+            <a:off x="10754270" y="1973112"/>
             <a:ext cx="1143000" cy="685800"/>
           </a:xfrm>
           <a:prstGeom prst="roundRect">
@@ -15541,7 +15541,7 @@
         </p:nvSpPr>
         <p:spPr>
           <a:xfrm>
-            <a:off x="8690879" y="2400300"/>
+            <a:off x="8690879" y="1969223"/>
             <a:ext cx="1276618" cy="685800"/>
           </a:xfrm>
           <a:prstGeom prst="roundRect">
@@ -15651,7 +15651,7 @@
         </p:nvCxnSpPr>
         <p:spPr>
           <a:xfrm>
-            <a:off x="9967497" y="2743200"/>
+            <a:off x="9967497" y="2312123"/>
             <a:ext cx="786773" cy="3889"/>
           </a:xfrm>
           <a:prstGeom prst="line">
@@ -15797,7 +15797,7 @@
         </p:nvSpPr>
         <p:spPr>
           <a:xfrm>
-            <a:off x="8300598" y="2492623"/>
+            <a:off x="8300598" y="2061546"/>
             <a:ext cx="357149" cy="215444"/>
           </a:xfrm>
           <a:prstGeom prst="rect">
@@ -16251,9 +16251,9 @@
           <p:nvPr/>
         </p:nvCxnSpPr>
         <p:spPr>
-          <a:xfrm>
-            <a:off x="7547849" y="2743200"/>
-            <a:ext cx="1143030" cy="0"/>
+          <a:xfrm flipV="1">
+            <a:off x="7547849" y="2312123"/>
+            <a:ext cx="1143030" cy="431077"/>
           </a:xfrm>
           <a:prstGeom prst="line">
             <a:avLst/>
@@ -17032,7 +17032,7 @@
         </p:nvSpPr>
         <p:spPr>
           <a:xfrm>
-            <a:off x="10367278" y="2497408"/>
+            <a:off x="10367278" y="2066331"/>
             <a:ext cx="357149" cy="215444"/>
           </a:xfrm>
           <a:prstGeom prst="rect">
@@ -17238,6 +17238,150 @@
         <p:spPr>
           <a:xfrm>
             <a:off x="8200369" y="5002491"/>
+            <a:ext cx="473528" cy="215444"/>
+          </a:xfrm>
+          <a:prstGeom prst="rect">
+            <a:avLst/>
+          </a:prstGeom>
+          <a:noFill/>
+          <a:ln>
+            <a:noFill/>
+          </a:ln>
+        </p:spPr>
+        <p:txBody>
+          <a:bodyPr wrap="none" lIns="0" tIns="0" rIns="0" bIns="0" rtlCol="0">
+            <a:spAutoFit/>
+          </a:bodyPr>
+          <a:lstStyle/>
+          <a:p>
+            <a:r>
+              <a:rPr lang="en-US" sz="1400" i="1" kern="0" spc="-30" dirty="0">
+                <a:latin typeface="Arial"/>
+                <a:cs typeface="Arial"/>
+              </a:rPr>
+              <a:t>POST</a:t>
+            </a:r>
+          </a:p>
+        </p:txBody>
+      </p:sp>
+      <p:sp>
+        <p:nvSpPr>
+          <p:cNvPr id="56" name="Rounded Rectangle 55">
+            <a:extLst>
+              <a:ext uri="{FF2B5EF4-FFF2-40B4-BE49-F238E27FC236}">
+                <a16:creationId xmlns:a16="http://schemas.microsoft.com/office/drawing/2014/main" id="{65265DEA-B38E-B945-805A-539C6E694BC3}"/>
+              </a:ext>
+            </a:extLst>
+          </p:cNvPr>
+          <p:cNvSpPr/>
+          <p:nvPr/>
+        </p:nvSpPr>
+        <p:spPr>
+          <a:xfrm>
+            <a:off x="8654341" y="2996449"/>
+            <a:ext cx="1276618" cy="927783"/>
+          </a:xfrm>
+          <a:prstGeom prst="roundRect">
+            <a:avLst/>
+          </a:prstGeom>
+          <a:solidFill>
+            <a:schemeClr val="accent5">
+              <a:lumMod val="40000"/>
+              <a:lumOff val="60000"/>
+            </a:schemeClr>
+          </a:solidFill>
+          <a:ln>
+            <a:noFill/>
+          </a:ln>
+          <a:effectLst/>
+        </p:spPr>
+        <p:style>
+          <a:lnRef idx="1">
+            <a:schemeClr val="accent1"/>
+          </a:lnRef>
+          <a:fillRef idx="3">
+            <a:schemeClr val="accent1"/>
+          </a:fillRef>
+          <a:effectRef idx="2">
+            <a:schemeClr val="accent1"/>
+          </a:effectRef>
+          <a:fontRef idx="minor">
+            <a:schemeClr val="lt1"/>
+          </a:fontRef>
+        </p:style>
+        <p:txBody>
+          <a:bodyPr rtlCol="0" anchor="ctr"/>
+          <a:lstStyle/>
+          <a:p>
+            <a:pPr algn="ctr"/>
+            <a:r>
+              <a:rPr lang="en-US" dirty="0"/>
+              <a:t>Watson Tone Analyzer</a:t>
+            </a:r>
+          </a:p>
+        </p:txBody>
+      </p:sp>
+      <p:cxnSp>
+        <p:nvCxnSpPr>
+          <p:cNvPr id="57" name="Straight Connector 56">
+            <a:extLst>
+              <a:ext uri="{FF2B5EF4-FFF2-40B4-BE49-F238E27FC236}">
+                <a16:creationId xmlns:a16="http://schemas.microsoft.com/office/drawing/2014/main" id="{A7BE60BD-04CD-8746-837E-7F1CA1949281}"/>
+              </a:ext>
+            </a:extLst>
+          </p:cNvPr>
+          <p:cNvCxnSpPr>
+            <a:cxnSpLocks/>
+            <a:stCxn id="5" idx="3"/>
+            <a:endCxn id="56" idx="1"/>
+          </p:cNvCxnSpPr>
+          <p:nvPr/>
+        </p:nvCxnSpPr>
+        <p:spPr>
+          <a:xfrm>
+            <a:off x="5486400" y="3429000"/>
+            <a:ext cx="3167941" cy="31341"/>
+          </a:xfrm>
+          <a:prstGeom prst="line">
+            <a:avLst/>
+          </a:prstGeom>
+          <a:ln w="19050">
+            <a:solidFill>
+              <a:schemeClr val="tx1"/>
+            </a:solidFill>
+            <a:tailEnd type="arrow"/>
+          </a:ln>
+        </p:spPr>
+        <p:style>
+          <a:lnRef idx="1">
+            <a:schemeClr val="accent1"/>
+          </a:lnRef>
+          <a:fillRef idx="0">
+            <a:schemeClr val="accent1"/>
+          </a:fillRef>
+          <a:effectRef idx="0">
+            <a:schemeClr val="accent1"/>
+          </a:effectRef>
+          <a:fontRef idx="minor">
+            <a:schemeClr val="tx1"/>
+          </a:fontRef>
+        </p:style>
+      </p:cxnSp>
+      <p:sp>
+        <p:nvSpPr>
+          <p:cNvPr id="66" name="TextBox 65">
+            <a:extLst>
+              <a:ext uri="{FF2B5EF4-FFF2-40B4-BE49-F238E27FC236}">
+                <a16:creationId xmlns:a16="http://schemas.microsoft.com/office/drawing/2014/main" id="{FB0C1DF8-1A77-BE42-8D9F-8D8B4CD9C41D}"/>
+              </a:ext>
+            </a:extLst>
+          </p:cNvPr>
+          <p:cNvSpPr txBox="1"/>
+          <p:nvPr/>
+        </p:nvSpPr>
+        <p:spPr>
+          <a:xfrm>
+            <a:off x="8163365" y="3192107"/>
             <a:ext cx="473528" cy="215444"/>
           </a:xfrm>
           <a:prstGeom prst="rect">

</xml_diff>